<commit_message>
OCP2 - Finalisation du notebook et ajout du graphique par image
</commit_message>
<xml_diff>
--- a/Support_Christophe_Ringot.pptx
+++ b/Support_Christophe_Ringot.pptx
@@ -5,7 +5,7 @@
     <p:sldMasterId id="2147483659" r:id="rId1"/>
   </p:sldMasterIdLst>
   <p:notesMasterIdLst>
-    <p:notesMasterId r:id="rId12"/>
+    <p:notesMasterId r:id="rId13"/>
   </p:notesMasterIdLst>
   <p:sldIdLst>
     <p:sldId id="256" r:id="rId2"/>
@@ -14,27 +14,28 @@
     <p:sldId id="264" r:id="rId5"/>
     <p:sldId id="259" r:id="rId6"/>
     <p:sldId id="265" r:id="rId7"/>
-    <p:sldId id="260" r:id="rId8"/>
-    <p:sldId id="261" r:id="rId9"/>
-    <p:sldId id="262" r:id="rId10"/>
-    <p:sldId id="263" r:id="rId11"/>
+    <p:sldId id="266" r:id="rId8"/>
+    <p:sldId id="260" r:id="rId9"/>
+    <p:sldId id="261" r:id="rId10"/>
+    <p:sldId id="262" r:id="rId11"/>
+    <p:sldId id="263" r:id="rId12"/>
   </p:sldIdLst>
   <p:sldSz cx="9144000" cy="5143500" type="screen16x9"/>
   <p:notesSz cx="6858000" cy="9144000"/>
   <p:embeddedFontLst>
     <p:embeddedFont>
       <p:font typeface="Lato" panose="020F0502020204030203" pitchFamily="34" charset="0"/>
-      <p:regular r:id="rId13"/>
-      <p:bold r:id="rId14"/>
-      <p:italic r:id="rId15"/>
-      <p:boldItalic r:id="rId16"/>
+      <p:regular r:id="rId14"/>
+      <p:bold r:id="rId15"/>
+      <p:italic r:id="rId16"/>
+      <p:boldItalic r:id="rId17"/>
     </p:embeddedFont>
     <p:embeddedFont>
       <p:font typeface="Montserrat" panose="00000500000000000000" pitchFamily="2" charset="0"/>
-      <p:regular r:id="rId17"/>
-      <p:bold r:id="rId18"/>
-      <p:italic r:id="rId19"/>
-      <p:boldItalic r:id="rId20"/>
+      <p:regular r:id="rId18"/>
+      <p:bold r:id="rId19"/>
+      <p:italic r:id="rId20"/>
+      <p:boldItalic r:id="rId21"/>
     </p:embeddedFont>
   </p:embeddedFontLst>
   <p:defaultTextStyle>
@@ -1379,7 +1380,7 @@
         </p:nvSpPr>
         <p:spPr>
           <a:xfrm>
-            <a:off x="381300" y="685800"/>
+            <a:off x="381000" y="685800"/>
             <a:ext cx="6096000" cy="3429000"/>
           </a:xfrm>
           <a:custGeom>
@@ -9745,6 +9746,164 @@
   <p:cSld>
     <p:spTree>
       <p:nvGrpSpPr>
+        <p:cNvPr id="1" name="Shape 169"/>
+        <p:cNvGrpSpPr/>
+        <p:nvPr/>
+      </p:nvGrpSpPr>
+      <p:grpSpPr>
+        <a:xfrm>
+          <a:off x="0" y="0"/>
+          <a:ext cx="0" cy="0"/>
+          <a:chOff x="0" y="0"/>
+          <a:chExt cx="0" cy="0"/>
+        </a:xfrm>
+      </p:grpSpPr>
+      <p:sp>
+        <p:nvSpPr>
+          <p:cNvPr id="170" name="Google Shape;170;p19"/>
+          <p:cNvSpPr txBox="1">
+            <a:spLocks noGrp="1"/>
+          </p:cNvSpPr>
+          <p:nvPr>
+            <p:ph type="title"/>
+          </p:nvPr>
+        </p:nvSpPr>
+        <p:spPr>
+          <a:xfrm>
+            <a:off x="1297500" y="393750"/>
+            <a:ext cx="7038900" cy="914100"/>
+          </a:xfrm>
+          <a:prstGeom prst="rect">
+            <a:avLst/>
+          </a:prstGeom>
+        </p:spPr>
+        <p:txBody>
+          <a:bodyPr spcFirstLastPara="1" wrap="square" lIns="91425" tIns="91425" rIns="91425" bIns="91425" anchor="t" anchorCtr="0">
+            <a:normAutofit fontScale="90000"/>
+          </a:bodyPr>
+          <a:lstStyle/>
+          <a:p>
+            <a:pPr marL="0" lvl="0" indent="0" algn="l" rtl="0">
+              <a:spcBef>
+                <a:spcPts val="0"/>
+              </a:spcBef>
+              <a:spcAft>
+                <a:spcPts val="0"/>
+              </a:spcAft>
+              <a:buNone/>
+            </a:pPr>
+            <a:r>
+              <a:rPr lang="fr"/>
+              <a:t>Analyse de la conformité réglementaire (slide optionnelle) </a:t>
+            </a:r>
+            <a:endParaRPr/>
+          </a:p>
+        </p:txBody>
+      </p:sp>
+      <p:sp>
+        <p:nvSpPr>
+          <p:cNvPr id="171" name="Google Shape;171;p19"/>
+          <p:cNvSpPr txBox="1">
+            <a:spLocks noGrp="1"/>
+          </p:cNvSpPr>
+          <p:nvPr>
+            <p:ph type="body" idx="1"/>
+          </p:nvPr>
+        </p:nvSpPr>
+        <p:spPr>
+          <a:xfrm>
+            <a:off x="1297500" y="1567550"/>
+            <a:ext cx="7038900" cy="2911200"/>
+          </a:xfrm>
+          <a:prstGeom prst="rect">
+            <a:avLst/>
+          </a:prstGeom>
+        </p:spPr>
+        <p:txBody>
+          <a:bodyPr spcFirstLastPara="1" wrap="square" lIns="91425" tIns="91425" rIns="91425" bIns="91425" anchor="t" anchorCtr="0">
+            <a:normAutofit/>
+          </a:bodyPr>
+          <a:lstStyle/>
+          <a:p>
+            <a:pPr marL="0" lvl="0" indent="0">
+              <a:spcAft>
+                <a:spcPts val="1200"/>
+              </a:spcAft>
+              <a:buNone/>
+            </a:pPr>
+            <a:r>
+              <a:rPr lang="fr-FR" dirty="0"/>
+              <a:t>- Flouter les visages ou masquer les identifiants si l'analyse des vêtements ne les nécessite pas.</a:t>
+            </a:r>
+          </a:p>
+          <a:p>
+            <a:pPr marL="0" lvl="0" indent="0">
+              <a:spcAft>
+                <a:spcPts val="1200"/>
+              </a:spcAft>
+              <a:buNone/>
+            </a:pPr>
+            <a:r>
+              <a:rPr lang="fr-FR" dirty="0"/>
+              <a:t>- Informer les utilisateurs (via une politique de confidentialité claire si en production).</a:t>
+            </a:r>
+          </a:p>
+          <a:p>
+            <a:pPr marL="0" lvl="0" indent="0">
+              <a:spcAft>
+                <a:spcPts val="1200"/>
+              </a:spcAft>
+              <a:buNone/>
+            </a:pPr>
+            <a:r>
+              <a:rPr lang="fr-FR" dirty="0"/>
+              <a:t>- S'assurer que les images traitées sont accessibles sous des licences compatibles avec l'usage d'analyse automatisée.</a:t>
+            </a:r>
+          </a:p>
+          <a:p>
+            <a:pPr marL="0" lvl="0" indent="0">
+              <a:spcAft>
+                <a:spcPts val="1200"/>
+              </a:spcAft>
+              <a:buNone/>
+            </a:pPr>
+            <a:r>
+              <a:rPr lang="fr-FR" dirty="0"/>
+              <a:t>- Transparence sur le fait que l’IA est utilisée.</a:t>
+            </a:r>
+          </a:p>
+          <a:p>
+            <a:pPr marL="0" lvl="0" indent="0">
+              <a:spcAft>
+                <a:spcPts val="1200"/>
+              </a:spcAft>
+              <a:buNone/>
+            </a:pPr>
+            <a:r>
+              <a:rPr lang="fr-FR" dirty="0"/>
+              <a:t>- Documentation technique du fonctionnement </a:t>
+            </a:r>
+            <a:r>
+              <a:rPr lang="fr-FR"/>
+              <a:t>du modèle,</a:t>
+            </a:r>
+            <a:endParaRPr dirty="0"/>
+          </a:p>
+        </p:txBody>
+      </p:sp>
+    </p:spTree>
+  </p:cSld>
+  <p:clrMapOvr>
+    <a:masterClrMapping/>
+  </p:clrMapOvr>
+</p:sld>
+</file>
+
+<file path=ppt/slides/slide11.xml><?xml version="1.0" encoding="utf-8"?>
+<p:sld xmlns:a="http://schemas.openxmlformats.org/drawingml/2006/main" xmlns:r="http://schemas.openxmlformats.org/officeDocument/2006/relationships" xmlns:p="http://schemas.openxmlformats.org/presentationml/2006/main">
+  <p:cSld>
+    <p:spTree>
+      <p:nvGrpSpPr>
         <p:cNvPr id="1" name="Shape 175"/>
         <p:cNvGrpSpPr/>
         <p:nvPr/>
@@ -10709,6 +10868,66 @@
   <p:cSld>
     <p:spTree>
       <p:nvGrpSpPr>
+        <p:cNvPr id="1" name=""/>
+        <p:cNvGrpSpPr/>
+        <p:nvPr/>
+      </p:nvGrpSpPr>
+      <p:grpSpPr>
+        <a:xfrm>
+          <a:off x="0" y="0"/>
+          <a:ext cx="0" cy="0"/>
+          <a:chOff x="0" y="0"/>
+          <a:chExt cx="0" cy="0"/>
+        </a:xfrm>
+      </p:grpSpPr>
+      <p:pic>
+        <p:nvPicPr>
+          <p:cNvPr id="5" name="Image 4">
+            <a:extLst>
+              <a:ext uri="{FF2B5EF4-FFF2-40B4-BE49-F238E27FC236}">
+                <a16:creationId xmlns:a16="http://schemas.microsoft.com/office/drawing/2014/main" id="{AB4C3D27-A502-1969-2ABA-E2AA6F391647}"/>
+              </a:ext>
+            </a:extLst>
+          </p:cNvPr>
+          <p:cNvPicPr>
+            <a:picLocks noChangeAspect="1"/>
+          </p:cNvPicPr>
+          <p:nvPr/>
+        </p:nvPicPr>
+        <p:blipFill>
+          <a:blip r:embed="rId2"/>
+          <a:stretch>
+            <a:fillRect/>
+          </a:stretch>
+        </p:blipFill>
+        <p:spPr>
+          <a:xfrm>
+            <a:off x="1098119" y="1152541"/>
+            <a:ext cx="7853376" cy="3632589"/>
+          </a:xfrm>
+          <a:prstGeom prst="rect">
+            <a:avLst/>
+          </a:prstGeom>
+        </p:spPr>
+      </p:pic>
+    </p:spTree>
+    <p:extLst>
+      <p:ext uri="{BB962C8B-B14F-4D97-AF65-F5344CB8AC3E}">
+        <p14:creationId xmlns:p14="http://schemas.microsoft.com/office/powerpoint/2010/main" val="2801858255"/>
+      </p:ext>
+    </p:extLst>
+  </p:cSld>
+  <p:clrMapOvr>
+    <a:masterClrMapping/>
+  </p:clrMapOvr>
+</p:sld>
+</file>
+
+<file path=ppt/slides/slide8.xml><?xml version="1.0" encoding="utf-8"?>
+<p:sld xmlns:a="http://schemas.openxmlformats.org/drawingml/2006/main" xmlns:r="http://schemas.openxmlformats.org/officeDocument/2006/relationships" xmlns:p="http://schemas.openxmlformats.org/presentationml/2006/main">
+  <p:cSld>
+    <p:spTree>
+      <p:nvGrpSpPr>
         <p:cNvPr id="1" name="Shape 157"/>
         <p:cNvGrpSpPr/>
         <p:nvPr/>
@@ -10854,7 +11073,7 @@
 </p:sld>
 </file>
 
-<file path=ppt/slides/slide8.xml><?xml version="1.0" encoding="utf-8"?>
+<file path=ppt/slides/slide9.xml><?xml version="1.0" encoding="utf-8"?>
 <p:sld xmlns:a="http://schemas.openxmlformats.org/drawingml/2006/main" xmlns:r="http://schemas.openxmlformats.org/officeDocument/2006/relationships" xmlns:p="http://schemas.openxmlformats.org/presentationml/2006/main">
   <p:cSld>
     <p:spTree>
@@ -11030,115 +11249,6 @@
               <a:rPr lang="fr" dirty="0"/>
               <a:t>Coût estimé : 9,24 €</a:t>
             </a:r>
-          </a:p>
-        </p:txBody>
-      </p:sp>
-    </p:spTree>
-  </p:cSld>
-  <p:clrMapOvr>
-    <a:masterClrMapping/>
-  </p:clrMapOvr>
-</p:sld>
-</file>
-
-<file path=ppt/slides/slide9.xml><?xml version="1.0" encoding="utf-8"?>
-<p:sld xmlns:a="http://schemas.openxmlformats.org/drawingml/2006/main" xmlns:r="http://schemas.openxmlformats.org/officeDocument/2006/relationships" xmlns:p="http://schemas.openxmlformats.org/presentationml/2006/main">
-  <p:cSld>
-    <p:spTree>
-      <p:nvGrpSpPr>
-        <p:cNvPr id="1" name="Shape 169"/>
-        <p:cNvGrpSpPr/>
-        <p:nvPr/>
-      </p:nvGrpSpPr>
-      <p:grpSpPr>
-        <a:xfrm>
-          <a:off x="0" y="0"/>
-          <a:ext cx="0" cy="0"/>
-          <a:chOff x="0" y="0"/>
-          <a:chExt cx="0" cy="0"/>
-        </a:xfrm>
-      </p:grpSpPr>
-      <p:sp>
-        <p:nvSpPr>
-          <p:cNvPr id="170" name="Google Shape;170;p19"/>
-          <p:cNvSpPr txBox="1">
-            <a:spLocks noGrp="1"/>
-          </p:cNvSpPr>
-          <p:nvPr>
-            <p:ph type="title"/>
-          </p:nvPr>
-        </p:nvSpPr>
-        <p:spPr>
-          <a:xfrm>
-            <a:off x="1297500" y="393750"/>
-            <a:ext cx="7038900" cy="914100"/>
-          </a:xfrm>
-          <a:prstGeom prst="rect">
-            <a:avLst/>
-          </a:prstGeom>
-        </p:spPr>
-        <p:txBody>
-          <a:bodyPr spcFirstLastPara="1" wrap="square" lIns="91425" tIns="91425" rIns="91425" bIns="91425" anchor="t" anchorCtr="0">
-            <a:normAutofit fontScale="90000"/>
-          </a:bodyPr>
-          <a:lstStyle/>
-          <a:p>
-            <a:pPr marL="0" lvl="0" indent="0" algn="l" rtl="0">
-              <a:spcBef>
-                <a:spcPts val="0"/>
-              </a:spcBef>
-              <a:spcAft>
-                <a:spcPts val="0"/>
-              </a:spcAft>
-              <a:buNone/>
-            </a:pPr>
-            <a:r>
-              <a:rPr lang="fr"/>
-              <a:t>Analyse de la conformité réglementaire (slide optionnelle) </a:t>
-            </a:r>
-            <a:endParaRPr/>
-          </a:p>
-        </p:txBody>
-      </p:sp>
-      <p:sp>
-        <p:nvSpPr>
-          <p:cNvPr id="171" name="Google Shape;171;p19"/>
-          <p:cNvSpPr txBox="1">
-            <a:spLocks noGrp="1"/>
-          </p:cNvSpPr>
-          <p:nvPr>
-            <p:ph type="body" idx="1"/>
-          </p:nvPr>
-        </p:nvSpPr>
-        <p:spPr>
-          <a:xfrm>
-            <a:off x="1297500" y="1567550"/>
-            <a:ext cx="7038900" cy="2911200"/>
-          </a:xfrm>
-          <a:prstGeom prst="rect">
-            <a:avLst/>
-          </a:prstGeom>
-        </p:spPr>
-        <p:txBody>
-          <a:bodyPr spcFirstLastPara="1" wrap="square" lIns="91425" tIns="91425" rIns="91425" bIns="91425" anchor="t" anchorCtr="0">
-            <a:normAutofit/>
-          </a:bodyPr>
-          <a:lstStyle/>
-          <a:p>
-            <a:pPr marL="0" lvl="0" indent="0" algn="l" rtl="0">
-              <a:spcBef>
-                <a:spcPts val="0"/>
-              </a:spcBef>
-              <a:spcAft>
-                <a:spcPts val="1200"/>
-              </a:spcAft>
-              <a:buNone/>
-            </a:pPr>
-            <a:r>
-              <a:rPr lang="fr"/>
-              <a:t>Optionnel : analyser la conformité avec le RGPD et le respect de l’IA act. </a:t>
-            </a:r>
-            <a:endParaRPr/>
           </a:p>
         </p:txBody>
       </p:sp>

</xml_diff>